<commit_message>
Added a team work slide in presentation
</commit_message>
<xml_diff>
--- a/IntelliMood.pptx
+++ b/IntelliMood.pptx
@@ -5,18 +5,19 @@
     <p:sldMasterId id="2147483696" r:id="rId1"/>
   </p:sldMasterIdLst>
   <p:notesMasterIdLst>
-    <p:notesMasterId r:id="rId8"/>
+    <p:notesMasterId r:id="rId9"/>
   </p:notesMasterIdLst>
   <p:handoutMasterIdLst>
-    <p:handoutMasterId r:id="rId9"/>
+    <p:handoutMasterId r:id="rId10"/>
   </p:handoutMasterIdLst>
   <p:sldIdLst>
     <p:sldId id="258" r:id="rId2"/>
     <p:sldId id="259" r:id="rId3"/>
     <p:sldId id="260" r:id="rId4"/>
     <p:sldId id="261" r:id="rId5"/>
-    <p:sldId id="263" r:id="rId6"/>
-    <p:sldId id="264" r:id="rId7"/>
+    <p:sldId id="265" r:id="rId6"/>
+    <p:sldId id="263" r:id="rId7"/>
+    <p:sldId id="264" r:id="rId8"/>
   </p:sldIdLst>
   <p:sldSz cx="12192000" cy="6858000"/>
   <p:notesSz cx="6858000" cy="9144000"/>
@@ -219,7 +220,7 @@
           <a:p>
             <a:fld id="{8906F081-8781-4431-8FD4-2CF608CD7C47}" type="datetimeFigureOut">
               <a:rPr lang="en-US" smtClean="0"/>
-              <a:t>3/16/2019</a:t>
+              <a:t>3/17/2019</a:t>
             </a:fld>
             <a:endParaRPr lang="en-US"/>
           </a:p>
@@ -384,7 +385,7 @@
           <a:p>
             <a:fld id="{F06CA47C-B7FD-4BE9-B0E6-81BA758D95F2}" type="datetimeFigureOut">
               <a:rPr lang="en-US" smtClean="0"/>
-              <a:t>3/16/2019</a:t>
+              <a:t>3/17/2019</a:t>
             </a:fld>
             <a:endParaRPr lang="en-US"/>
           </a:p>
@@ -896,7 +897,7 @@
           <a:p>
             <a:fld id="{33024136-D290-48F3-A182-4C46BEB5146B}" type="datetime1">
               <a:rPr lang="en-US" smtClean="0"/>
-              <a:t>3/16/2019</a:t>
+              <a:t>3/17/2019</a:t>
             </a:fld>
             <a:endParaRPr lang="en-US" dirty="0"/>
           </a:p>
@@ -1081,7 +1082,7 @@
           <a:p>
             <a:fld id="{9CC7D44C-38B1-4D0F-9006-D5774F331095}" type="datetime1">
               <a:rPr lang="en-US" smtClean="0"/>
-              <a:t>3/16/2019</a:t>
+              <a:t>3/17/2019</a:t>
             </a:fld>
             <a:endParaRPr lang="en-US"/>
           </a:p>
@@ -1276,7 +1277,7 @@
           <a:p>
             <a:fld id="{F98D518A-FD4F-4358-B95B-9DB5A17160FB}" type="datetime1">
               <a:rPr lang="en-US" smtClean="0"/>
-              <a:t>3/16/2019</a:t>
+              <a:t>3/17/2019</a:t>
             </a:fld>
             <a:endParaRPr lang="en-US"/>
           </a:p>
@@ -1470,7 +1471,7 @@
           <a:p>
             <a:fld id="{5E2A9F4F-03AD-4497-A65D-076601BD41D2}" type="datetime1">
               <a:rPr lang="en-US" smtClean="0"/>
-              <a:t>3/16/2019</a:t>
+              <a:t>3/17/2019</a:t>
             </a:fld>
             <a:endParaRPr lang="en-US"/>
           </a:p>
@@ -1694,7 +1695,7 @@
           <a:p>
             <a:fld id="{EDFBF3AC-A781-43AA-8BD5-B12F49168B94}" type="datetime1">
               <a:rPr lang="en-US" smtClean="0"/>
-              <a:t>3/16/2019</a:t>
+              <a:t>3/17/2019</a:t>
             </a:fld>
             <a:endParaRPr lang="en-US"/>
           </a:p>
@@ -1980,7 +1981,7 @@
           <a:p>
             <a:fld id="{C5256A41-C91B-43FF-9881-F5DA9878418F}" type="datetime1">
               <a:rPr lang="en-US" smtClean="0"/>
-              <a:t>3/16/2019</a:t>
+              <a:t>3/17/2019</a:t>
             </a:fld>
             <a:endParaRPr lang="en-US"/>
           </a:p>
@@ -2384,7 +2385,7 @@
           <a:p>
             <a:fld id="{FFD7AA76-41EE-4C13-950E-E611B8B8FC52}" type="datetime1">
               <a:rPr lang="en-US" smtClean="0"/>
-              <a:t>3/16/2019</a:t>
+              <a:t>3/17/2019</a:t>
             </a:fld>
             <a:endParaRPr lang="en-US"/>
           </a:p>
@@ -2532,7 +2533,7 @@
           <a:p>
             <a:fld id="{89407A26-E7BC-4498-97E4-87AF12377CA9}" type="datetime1">
               <a:rPr lang="en-US" smtClean="0"/>
-              <a:t>3/16/2019</a:t>
+              <a:t>3/17/2019</a:t>
             </a:fld>
             <a:endParaRPr lang="en-US"/>
           </a:p>
@@ -2647,7 +2648,7 @@
           <a:p>
             <a:fld id="{93EA4171-1117-4486-993C-35A7470D8847}" type="datetime1">
               <a:rPr lang="en-US" smtClean="0"/>
-              <a:t>3/16/2019</a:t>
+              <a:t>3/17/2019</a:t>
             </a:fld>
             <a:endParaRPr lang="en-US"/>
           </a:p>
@@ -2920,7 +2921,7 @@
           <a:p>
             <a:fld id="{472A4CB8-1563-4663-81DB-74EB416C19BE}" type="datetime1">
               <a:rPr lang="en-US" smtClean="0"/>
-              <a:t>3/16/2019</a:t>
+              <a:t>3/17/2019</a:t>
             </a:fld>
             <a:endParaRPr lang="en-US"/>
           </a:p>
@@ -3258,7 +3259,7 @@
           <a:p>
             <a:fld id="{0C6724CE-2468-448B-87C1-A92EDD78369B}" type="datetime1">
               <a:rPr lang="en-US" smtClean="0"/>
-              <a:t>3/16/2019</a:t>
+              <a:t>3/17/2019</a:t>
             </a:fld>
             <a:endParaRPr lang="en-US"/>
           </a:p>
@@ -3521,7 +3522,7 @@
           <a:p>
             <a:fld id="{4CD11720-76E7-46E6-B0AA-057287C42052}" type="datetime1">
               <a:rPr lang="en-US" smtClean="0"/>
-              <a:t>3/16/2019</a:t>
+              <a:t>3/17/2019</a:t>
             </a:fld>
             <a:endParaRPr lang="en-US" dirty="0"/>
           </a:p>
@@ -4286,11 +4287,7 @@
           <a:p>
             <a:r>
               <a:rPr lang="en-US" dirty="0" smtClean="0"/>
-              <a:t>IDE</a:t>
-            </a:r>
-            <a:r>
-              <a:rPr lang="en-US" dirty="0" smtClean="0"/>
-              <a:t>:                                 Team Collaboration:</a:t>
+              <a:t>IDE:                                 Team Collaboration:</a:t>
             </a:r>
           </a:p>
           <a:p>
@@ -4303,7 +4300,6 @@
               <a:rPr lang="en-US" dirty="0" smtClean="0"/>
               <a:t>                                          </a:t>
             </a:r>
-            <a:endParaRPr lang="en-US" dirty="0" smtClean="0"/>
           </a:p>
           <a:p>
             <a:pPr marL="68580" indent="0">
@@ -4432,6 +4428,100 @@
           <a:p>
             <a:r>
               <a:rPr lang="en-US" dirty="0" smtClean="0"/>
+              <a:t>Team Work</a:t>
+            </a:r>
+            <a:endParaRPr lang="en-US" dirty="0"/>
+          </a:p>
+        </p:txBody>
+      </p:sp>
+      <p:pic>
+        <p:nvPicPr>
+          <p:cNvPr id="4" name="Content Placeholder 3"/>
+          <p:cNvPicPr>
+            <a:picLocks noGrp="1" noChangeAspect="1"/>
+          </p:cNvPicPr>
+          <p:nvPr>
+            <p:ph idx="1"/>
+          </p:nvPr>
+        </p:nvPicPr>
+        <p:blipFill>
+          <a:blip r:embed="rId2" cstate="print">
+            <a:extLst>
+              <a:ext uri="{28A0092B-C50C-407E-A947-70E740481C1C}">
+                <a14:useLocalDpi xmlns:a14="http://schemas.microsoft.com/office/drawing/2010/main" val="0"/>
+              </a:ext>
+            </a:extLst>
+          </a:blip>
+          <a:stretch>
+            <a:fillRect/>
+          </a:stretch>
+        </p:blipFill>
+        <p:spPr>
+          <a:xfrm>
+            <a:off x="2075556" y="1426464"/>
+            <a:ext cx="7803604" cy="4389527"/>
+          </a:xfrm>
+        </p:spPr>
+      </p:pic>
+    </p:spTree>
+    <p:extLst>
+      <p:ext uri="{BB962C8B-B14F-4D97-AF65-F5344CB8AC3E}">
+        <p14:creationId xmlns:p14="http://schemas.microsoft.com/office/powerpoint/2010/main" val="2370274954"/>
+      </p:ext>
+    </p:extLst>
+  </p:cSld>
+  <p:clrMapOvr>
+    <a:masterClrMapping/>
+  </p:clrMapOvr>
+  <mc:AlternateContent xmlns:mc="http://schemas.openxmlformats.org/markup-compatibility/2006" xmlns:p14="http://schemas.microsoft.com/office/powerpoint/2010/main">
+    <mc:Choice Requires="p14">
+      <p:transition spd="med" p14:dur="700">
+        <p:fade/>
+      </p:transition>
+    </mc:Choice>
+    <mc:Fallback xmlns="">
+      <p:transition spd="med">
+        <p:fade/>
+      </p:transition>
+    </mc:Fallback>
+  </mc:AlternateContent>
+</p:sld>
+</file>
+
+<file path=ppt/slides/slide6.xml><?xml version="1.0" encoding="utf-8"?>
+<p:sld xmlns:a="http://schemas.openxmlformats.org/drawingml/2006/main" xmlns:r="http://schemas.openxmlformats.org/officeDocument/2006/relationships" xmlns:p="http://schemas.openxmlformats.org/presentationml/2006/main">
+  <p:cSld>
+    <p:spTree>
+      <p:nvGrpSpPr>
+        <p:cNvPr id="1" name=""/>
+        <p:cNvGrpSpPr/>
+        <p:nvPr/>
+      </p:nvGrpSpPr>
+      <p:grpSpPr>
+        <a:xfrm>
+          <a:off x="0" y="0"/>
+          <a:ext cx="0" cy="0"/>
+          <a:chOff x="0" y="0"/>
+          <a:chExt cx="0" cy="0"/>
+        </a:xfrm>
+      </p:grpSpPr>
+      <p:sp>
+        <p:nvSpPr>
+          <p:cNvPr id="2" name="Title 1"/>
+          <p:cNvSpPr>
+            <a:spLocks noGrp="1"/>
+          </p:cNvSpPr>
+          <p:nvPr>
+            <p:ph type="title"/>
+          </p:nvPr>
+        </p:nvSpPr>
+        <p:spPr/>
+        <p:txBody>
+          <a:bodyPr/>
+          <a:lstStyle/>
+          <a:p>
+            <a:r>
+              <a:rPr lang="en-US" dirty="0" smtClean="0"/>
               <a:t>Difficulties</a:t>
             </a:r>
             <a:endParaRPr lang="en-US" dirty="0"/>
@@ -4513,7 +4603,7 @@
 </p:sld>
 </file>
 
-<file path=ppt/slides/slide6.xml><?xml version="1.0" encoding="utf-8"?>
+<file path=ppt/slides/slide7.xml><?xml version="1.0" encoding="utf-8"?>
 <p:sld xmlns:a="http://schemas.openxmlformats.org/drawingml/2006/main" xmlns:r="http://schemas.openxmlformats.org/officeDocument/2006/relationships" xmlns:p="http://schemas.openxmlformats.org/presentationml/2006/main">
   <p:cSld>
     <p:spTree>

</xml_diff>

<commit_message>
Small presentation adjustment & changed text analysis method
</commit_message>
<xml_diff>
--- a/IntelliMood.pptx
+++ b/IntelliMood.pptx
@@ -5,10 +5,10 @@
     <p:sldMasterId id="2147483696" r:id="rId1"/>
   </p:sldMasterIdLst>
   <p:notesMasterIdLst>
-    <p:notesMasterId r:id="rId9"/>
+    <p:notesMasterId r:id="rId10"/>
   </p:notesMasterIdLst>
   <p:handoutMasterIdLst>
-    <p:handoutMasterId r:id="rId10"/>
+    <p:handoutMasterId r:id="rId11"/>
   </p:handoutMasterIdLst>
   <p:sldIdLst>
     <p:sldId id="258" r:id="rId2"/>
@@ -18,6 +18,7 @@
     <p:sldId id="265" r:id="rId6"/>
     <p:sldId id="263" r:id="rId7"/>
     <p:sldId id="264" r:id="rId8"/>
+    <p:sldId id="266" r:id="rId9"/>
   </p:sldIdLst>
   <p:sldSz cx="12192000" cy="6858000"/>
   <p:notesSz cx="6858000" cy="9144000"/>
@@ -3966,6 +3967,13 @@
       </p:transition>
     </mc:Fallback>
   </mc:AlternateContent>
+  <p:timing>
+    <p:tnLst>
+      <p:par>
+        <p:cTn id="1" dur="indefinite" restart="never" nodeType="tmRoot"/>
+      </p:par>
+    </p:tnLst>
+  </p:timing>
 </p:sld>
 </file>
 
@@ -4045,12 +4053,16 @@
               <a:t> – </a:t>
             </a:r>
             <a:r>
-              <a:rPr lang="bg-BG" sz="2400" b="1" dirty="0"/>
-              <a:t>капитан, </a:t>
+              <a:rPr lang="bg-BG" sz="2400" b="1" dirty="0" smtClean="0"/>
+              <a:t>капитан</a:t>
+            </a:r>
+            <a:r>
+              <a:rPr lang="en-US" sz="2400" b="1" dirty="0" smtClean="0"/>
+              <a:t>, </a:t>
             </a:r>
             <a:r>
               <a:rPr lang="en-US" sz="2400" b="1" dirty="0"/>
-              <a:t>front-end, back-end, machine learning</a:t>
+              <a:t>back-end, machine learning</a:t>
             </a:r>
           </a:p>
           <a:p>
@@ -4111,6 +4123,13 @@
       </p:transition>
     </mc:Fallback>
   </mc:AlternateContent>
+  <p:timing>
+    <p:tnLst>
+      <p:par>
+        <p:cTn id="1" dur="indefinite" restart="never" nodeType="tmRoot"/>
+      </p:par>
+    </p:tnLst>
+  </p:timing>
 </p:sld>
 </file>
 
@@ -4199,6 +4218,13 @@
       </p:transition>
     </mc:Fallback>
   </mc:AlternateContent>
+  <p:timing>
+    <p:tnLst>
+      <p:par>
+        <p:cTn id="1" dur="indefinite" restart="never" nodeType="tmRoot"/>
+      </p:par>
+    </p:tnLst>
+  </p:timing>
 </p:sld>
 </file>
 
@@ -4254,7 +4280,7 @@
         </p:nvSpPr>
         <p:spPr>
           <a:xfrm>
-            <a:off x="619124" y="1770502"/>
+            <a:off x="619125" y="1426464"/>
             <a:ext cx="10963275" cy="4525963"/>
           </a:xfrm>
         </p:spPr>
@@ -4273,8 +4299,40 @@
               <a:t>C</a:t>
             </a:r>
             <a:r>
+              <a:rPr lang="en-US" dirty="0" smtClean="0"/>
+              <a:t>#</a:t>
+            </a:r>
+            <a:r>
+              <a:rPr lang="bg-BG" dirty="0" smtClean="0"/>
+              <a:t>, </a:t>
+            </a:r>
+            <a:r>
+              <a:rPr lang="en-US" dirty="0" err="1" smtClean="0"/>
+              <a:t>Asp.Net</a:t>
+            </a:r>
+            <a:r>
+              <a:rPr lang="en-US" dirty="0" smtClean="0"/>
+              <a:t> Core, </a:t>
+            </a:r>
+            <a:r>
+              <a:rPr lang="en-US" dirty="0" err="1" smtClean="0"/>
+              <a:t>EntityFramework</a:t>
+            </a:r>
+            <a:r>
+              <a:rPr lang="en-US" dirty="0" smtClean="0"/>
+              <a:t> Core, </a:t>
+            </a:r>
+            <a:r>
+              <a:rPr lang="en-US" dirty="0" err="1" smtClean="0"/>
+              <a:t>ML.Net</a:t>
+            </a:r>
+            <a:r>
+              <a:rPr lang="en-US" dirty="0" smtClean="0"/>
+              <a:t>, </a:t>
+            </a:r>
+            <a:r>
               <a:rPr lang="en-US" dirty="0"/>
-              <a:t>#, HTML, </a:t>
+              <a:t>HTML, </a:t>
             </a:r>
             <a:r>
               <a:rPr lang="en-US" dirty="0" smtClean="0"/>
@@ -4287,8 +4345,13 @@
           <a:p>
             <a:r>
               <a:rPr lang="en-US" dirty="0" smtClean="0"/>
-              <a:t>IDE:                                 Team Collaboration:</a:t>
-            </a:r>
+              <a:t>IDE:                                 Team </a:t>
+            </a:r>
+            <a:r>
+              <a:rPr lang="en-US" dirty="0" smtClean="0"/>
+              <a:t>Collaboration Tool:</a:t>
+            </a:r>
+            <a:endParaRPr lang="en-US" dirty="0" smtClean="0"/>
           </a:p>
           <a:p>
             <a:pPr lvl="8"/>
@@ -4391,6 +4454,13 @@
       </p:transition>
     </mc:Fallback>
   </mc:AlternateContent>
+  <p:timing>
+    <p:tnLst>
+      <p:par>
+        <p:cTn id="1" dur="indefinite" restart="never" nodeType="tmRoot"/>
+      </p:par>
+    </p:tnLst>
+  </p:timing>
 </p:sld>
 </file>
 
@@ -4485,6 +4555,13 @@
       </p:transition>
     </mc:Fallback>
   </mc:AlternateContent>
+  <p:timing>
+    <p:tnLst>
+      <p:par>
+        <p:cTn id="1" dur="indefinite" restart="never" nodeType="tmRoot"/>
+      </p:par>
+    </p:tnLst>
+  </p:timing>
 </p:sld>
 </file>
 
@@ -4538,9 +4615,16 @@
             <p:ph idx="1"/>
           </p:nvPr>
         </p:nvSpPr>
-        <p:spPr/>
-        <p:txBody>
-          <a:bodyPr/>
+        <p:spPr>
+          <a:xfrm>
+            <a:off x="1219200" y="1346954"/>
+            <a:ext cx="10363200" cy="4572000"/>
+          </a:xfrm>
+        </p:spPr>
+        <p:txBody>
+          <a:bodyPr>
+            <a:normAutofit fontScale="85000" lnSpcReduction="20000"/>
+          </a:bodyPr>
           <a:lstStyle/>
           <a:p>
             <a:r>
@@ -4572,8 +4656,36 @@
           <a:p>
             <a:r>
               <a:rPr lang="en-US" dirty="0" smtClean="0"/>
-              <a:t>Extracting emotions from text</a:t>
-            </a:r>
+              <a:t>Extracting emotions from </a:t>
+            </a:r>
+            <a:r>
+              <a:rPr lang="en-US" dirty="0" smtClean="0"/>
+              <a:t>text</a:t>
+            </a:r>
+          </a:p>
+          <a:p>
+            <a:endParaRPr lang="en-US" dirty="0"/>
+          </a:p>
+          <a:p>
+            <a:r>
+              <a:rPr lang="en-US" dirty="0" err="1" smtClean="0"/>
+              <a:t>ML.Net</a:t>
+            </a:r>
+            <a:r>
+              <a:rPr lang="en-US" dirty="0" smtClean="0"/>
+              <a:t> library</a:t>
+            </a:r>
+          </a:p>
+          <a:p>
+            <a:endParaRPr lang="en-US" dirty="0"/>
+          </a:p>
+          <a:p>
+            <a:r>
+              <a:rPr lang="en-US" dirty="0" smtClean="0"/>
+              <a:t>Mobile Friendly</a:t>
+            </a:r>
+          </a:p>
+          <a:p>
             <a:endParaRPr lang="en-US" dirty="0"/>
           </a:p>
         </p:txBody>
@@ -4660,7 +4772,43 @@
           <a:p>
             <a:r>
               <a:rPr lang="en-US" dirty="0" smtClean="0"/>
-              <a:t>A mobile version for both Android and IOS</a:t>
+              <a:t>A mobile version for both Android and </a:t>
+            </a:r>
+            <a:r>
+              <a:rPr lang="en-US" dirty="0" smtClean="0"/>
+              <a:t>IOS</a:t>
+            </a:r>
+          </a:p>
+          <a:p>
+            <a:r>
+              <a:rPr lang="en-US" dirty="0" smtClean="0"/>
+              <a:t>Different ways of logging in (Facebook, Google, </a:t>
+            </a:r>
+            <a:r>
+              <a:rPr lang="en-US" dirty="0" err="1" smtClean="0"/>
+              <a:t>GitHub</a:t>
+            </a:r>
+            <a:r>
+              <a:rPr lang="en-US" dirty="0" smtClean="0"/>
+              <a:t> </a:t>
+            </a:r>
+            <a:r>
+              <a:rPr lang="en-US" dirty="0" err="1" smtClean="0"/>
+              <a:t>etc</a:t>
+            </a:r>
+            <a:r>
+              <a:rPr lang="en-US" dirty="0" smtClean="0"/>
+              <a:t>)</a:t>
+            </a:r>
+          </a:p>
+          <a:p>
+            <a:r>
+              <a:rPr lang="en-US" dirty="0" smtClean="0"/>
+              <a:t>Notifications based on </a:t>
+            </a:r>
+            <a:r>
+              <a:rPr lang="en-US" smtClean="0"/>
+              <a:t>user time zone</a:t>
             </a:r>
             <a:endParaRPr lang="en-US" dirty="0"/>
           </a:p>
@@ -4683,6 +4831,94 @@
       </p:transition>
     </mc:Choice>
     <mc:Fallback xmlns="">
+      <p:transition spd="med">
+        <p:fade/>
+      </p:transition>
+    </mc:Fallback>
+  </mc:AlternateContent>
+</p:sld>
+</file>
+
+<file path=ppt/slides/slide8.xml><?xml version="1.0" encoding="utf-8"?>
+<p:sld xmlns:a="http://schemas.openxmlformats.org/drawingml/2006/main" xmlns:r="http://schemas.openxmlformats.org/officeDocument/2006/relationships" xmlns:p="http://schemas.openxmlformats.org/presentationml/2006/main">
+  <p:cSld>
+    <p:spTree>
+      <p:nvGrpSpPr>
+        <p:cNvPr id="1" name=""/>
+        <p:cNvGrpSpPr/>
+        <p:nvPr/>
+      </p:nvGrpSpPr>
+      <p:grpSpPr>
+        <a:xfrm>
+          <a:off x="0" y="0"/>
+          <a:ext cx="0" cy="0"/>
+          <a:chOff x="0" y="0"/>
+          <a:chExt cx="0" cy="0"/>
+        </a:xfrm>
+      </p:grpSpPr>
+      <p:sp>
+        <p:nvSpPr>
+          <p:cNvPr id="2" name="Title 1"/>
+          <p:cNvSpPr>
+            <a:spLocks noGrp="1"/>
+          </p:cNvSpPr>
+          <p:nvPr>
+            <p:ph type="title"/>
+          </p:nvPr>
+        </p:nvSpPr>
+        <p:spPr/>
+        <p:txBody>
+          <a:bodyPr/>
+          <a:lstStyle/>
+          <a:p>
+            <a:r>
+              <a:rPr lang="en-US" dirty="0" smtClean="0"/>
+              <a:t>That’s all, folks!</a:t>
+            </a:r>
+            <a:endParaRPr lang="en-US" dirty="0"/>
+          </a:p>
+        </p:txBody>
+      </p:sp>
+      <p:sp>
+        <p:nvSpPr>
+          <p:cNvPr id="3" name="Content Placeholder 2"/>
+          <p:cNvSpPr>
+            <a:spLocks noGrp="1"/>
+          </p:cNvSpPr>
+          <p:nvPr>
+            <p:ph idx="1"/>
+          </p:nvPr>
+        </p:nvSpPr>
+        <p:spPr/>
+        <p:txBody>
+          <a:bodyPr/>
+          <a:lstStyle/>
+          <a:p>
+            <a:r>
+              <a:rPr lang="en-US" dirty="0" smtClean="0"/>
+              <a:t>Questions?</a:t>
+            </a:r>
+            <a:endParaRPr lang="en-US" dirty="0"/>
+          </a:p>
+        </p:txBody>
+      </p:sp>
+    </p:spTree>
+    <p:extLst>
+      <p:ext uri="{BB962C8B-B14F-4D97-AF65-F5344CB8AC3E}">
+        <p14:creationId xmlns:p14="http://schemas.microsoft.com/office/powerpoint/2010/main" val="2792188525"/>
+      </p:ext>
+    </p:extLst>
+  </p:cSld>
+  <p:clrMapOvr>
+    <a:masterClrMapping/>
+  </p:clrMapOvr>
+  <mc:AlternateContent xmlns:mc="http://schemas.openxmlformats.org/markup-compatibility/2006">
+    <mc:Choice xmlns:p14="http://schemas.microsoft.com/office/powerpoint/2010/main" Requires="p14">
+      <p:transition spd="med" p14:dur="700">
+        <p:fade/>
+      </p:transition>
+    </mc:Choice>
+    <mc:Fallback>
       <p:transition spd="med">
         <p:fade/>
       </p:transition>

</xml_diff>

<commit_message>
Changed the presentation a little bit
</commit_message>
<xml_diff>
--- a/IntelliMood.pptx
+++ b/IntelliMood.pptx
@@ -5,20 +5,19 @@
     <p:sldMasterId id="2147483696" r:id="rId1"/>
   </p:sldMasterIdLst>
   <p:notesMasterIdLst>
-    <p:notesMasterId r:id="rId10"/>
+    <p:notesMasterId r:id="rId9"/>
   </p:notesMasterIdLst>
   <p:handoutMasterIdLst>
-    <p:handoutMasterId r:id="rId11"/>
+    <p:handoutMasterId r:id="rId10"/>
   </p:handoutMasterIdLst>
   <p:sldIdLst>
     <p:sldId id="258" r:id="rId2"/>
     <p:sldId id="259" r:id="rId3"/>
     <p:sldId id="260" r:id="rId4"/>
     <p:sldId id="261" r:id="rId5"/>
-    <p:sldId id="265" r:id="rId6"/>
-    <p:sldId id="263" r:id="rId7"/>
-    <p:sldId id="264" r:id="rId8"/>
-    <p:sldId id="266" r:id="rId9"/>
+    <p:sldId id="263" r:id="rId6"/>
+    <p:sldId id="264" r:id="rId7"/>
+    <p:sldId id="266" r:id="rId8"/>
   </p:sldIdLst>
   <p:sldSz cx="12192000" cy="6858000"/>
   <p:notesSz cx="6858000" cy="9144000"/>
@@ -221,7 +220,7 @@
           <a:p>
             <a:fld id="{8906F081-8781-4431-8FD4-2CF608CD7C47}" type="datetimeFigureOut">
               <a:rPr lang="en-US" smtClean="0"/>
-              <a:t>3/17/2019</a:t>
+              <a:t>4/19/2019</a:t>
             </a:fld>
             <a:endParaRPr lang="en-US"/>
           </a:p>
@@ -386,7 +385,7 @@
           <a:p>
             <a:fld id="{F06CA47C-B7FD-4BE9-B0E6-81BA758D95F2}" type="datetimeFigureOut">
               <a:rPr lang="en-US" smtClean="0"/>
-              <a:t>3/17/2019</a:t>
+              <a:t>4/19/2019</a:t>
             </a:fld>
             <a:endParaRPr lang="en-US"/>
           </a:p>
@@ -898,7 +897,7 @@
           <a:p>
             <a:fld id="{33024136-D290-48F3-A182-4C46BEB5146B}" type="datetime1">
               <a:rPr lang="en-US" smtClean="0"/>
-              <a:t>3/17/2019</a:t>
+              <a:t>4/19/2019</a:t>
             </a:fld>
             <a:endParaRPr lang="en-US" dirty="0"/>
           </a:p>
@@ -1083,7 +1082,7 @@
           <a:p>
             <a:fld id="{9CC7D44C-38B1-4D0F-9006-D5774F331095}" type="datetime1">
               <a:rPr lang="en-US" smtClean="0"/>
-              <a:t>3/17/2019</a:t>
+              <a:t>4/19/2019</a:t>
             </a:fld>
             <a:endParaRPr lang="en-US"/>
           </a:p>
@@ -1278,7 +1277,7 @@
           <a:p>
             <a:fld id="{F98D518A-FD4F-4358-B95B-9DB5A17160FB}" type="datetime1">
               <a:rPr lang="en-US" smtClean="0"/>
-              <a:t>3/17/2019</a:t>
+              <a:t>4/19/2019</a:t>
             </a:fld>
             <a:endParaRPr lang="en-US"/>
           </a:p>
@@ -1472,7 +1471,7 @@
           <a:p>
             <a:fld id="{5E2A9F4F-03AD-4497-A65D-076601BD41D2}" type="datetime1">
               <a:rPr lang="en-US" smtClean="0"/>
-              <a:t>3/17/2019</a:t>
+              <a:t>4/19/2019</a:t>
             </a:fld>
             <a:endParaRPr lang="en-US"/>
           </a:p>
@@ -1696,7 +1695,7 @@
           <a:p>
             <a:fld id="{EDFBF3AC-A781-43AA-8BD5-B12F49168B94}" type="datetime1">
               <a:rPr lang="en-US" smtClean="0"/>
-              <a:t>3/17/2019</a:t>
+              <a:t>4/19/2019</a:t>
             </a:fld>
             <a:endParaRPr lang="en-US"/>
           </a:p>
@@ -1982,7 +1981,7 @@
           <a:p>
             <a:fld id="{C5256A41-C91B-43FF-9881-F5DA9878418F}" type="datetime1">
               <a:rPr lang="en-US" smtClean="0"/>
-              <a:t>3/17/2019</a:t>
+              <a:t>4/19/2019</a:t>
             </a:fld>
             <a:endParaRPr lang="en-US"/>
           </a:p>
@@ -2386,7 +2385,7 @@
           <a:p>
             <a:fld id="{FFD7AA76-41EE-4C13-950E-E611B8B8FC52}" type="datetime1">
               <a:rPr lang="en-US" smtClean="0"/>
-              <a:t>3/17/2019</a:t>
+              <a:t>4/19/2019</a:t>
             </a:fld>
             <a:endParaRPr lang="en-US"/>
           </a:p>
@@ -2534,7 +2533,7 @@
           <a:p>
             <a:fld id="{89407A26-E7BC-4498-97E4-87AF12377CA9}" type="datetime1">
               <a:rPr lang="en-US" smtClean="0"/>
-              <a:t>3/17/2019</a:t>
+              <a:t>4/19/2019</a:t>
             </a:fld>
             <a:endParaRPr lang="en-US"/>
           </a:p>
@@ -2649,7 +2648,7 @@
           <a:p>
             <a:fld id="{93EA4171-1117-4486-993C-35A7470D8847}" type="datetime1">
               <a:rPr lang="en-US" smtClean="0"/>
-              <a:t>3/17/2019</a:t>
+              <a:t>4/19/2019</a:t>
             </a:fld>
             <a:endParaRPr lang="en-US"/>
           </a:p>
@@ -2922,7 +2921,7 @@
           <a:p>
             <a:fld id="{472A4CB8-1563-4663-81DB-74EB416C19BE}" type="datetime1">
               <a:rPr lang="en-US" smtClean="0"/>
-              <a:t>3/17/2019</a:t>
+              <a:t>4/19/2019</a:t>
             </a:fld>
             <a:endParaRPr lang="en-US"/>
           </a:p>
@@ -3260,7 +3259,7 @@
           <a:p>
             <a:fld id="{0C6724CE-2468-448B-87C1-A92EDD78369B}" type="datetime1">
               <a:rPr lang="en-US" smtClean="0"/>
-              <a:t>3/17/2019</a:t>
+              <a:t>4/19/2019</a:t>
             </a:fld>
             <a:endParaRPr lang="en-US"/>
           </a:p>
@@ -3523,7 +3522,7 @@
           <a:p>
             <a:fld id="{4CD11720-76E7-46E6-B0AA-057287C42052}" type="datetime1">
               <a:rPr lang="en-US" smtClean="0"/>
-              <a:t>3/17/2019</a:t>
+              <a:t>4/19/2019</a:t>
             </a:fld>
             <a:endParaRPr lang="en-US" dirty="0"/>
           </a:p>
@@ -4053,16 +4052,12 @@
               <a:t> – </a:t>
             </a:r>
             <a:r>
-              <a:rPr lang="bg-BG" sz="2400" b="1" dirty="0" smtClean="0"/>
-              <a:t>капитан</a:t>
-            </a:r>
-            <a:r>
               <a:rPr lang="en-US" sz="2400" b="1" dirty="0" smtClean="0"/>
-              <a:t>, </a:t>
+              <a:t>back-end</a:t>
             </a:r>
             <a:r>
               <a:rPr lang="en-US" sz="2400" b="1" dirty="0"/>
-              <a:t>back-end, machine learning</a:t>
+              <a:t>, machine learning</a:t>
             </a:r>
           </a:p>
           <a:p>
@@ -4296,11 +4291,7 @@
           <a:p>
             <a:r>
               <a:rPr lang="en-US" dirty="0" smtClean="0"/>
-              <a:t>C</a:t>
-            </a:r>
-            <a:r>
-              <a:rPr lang="en-US" dirty="0" smtClean="0"/>
-              <a:t>#</a:t>
+              <a:t>C#</a:t>
             </a:r>
             <a:r>
               <a:rPr lang="bg-BG" dirty="0" smtClean="0"/>
@@ -4345,13 +4336,8 @@
           <a:p>
             <a:r>
               <a:rPr lang="en-US" dirty="0" smtClean="0"/>
-              <a:t>IDE:                                 Team </a:t>
-            </a:r>
-            <a:r>
-              <a:rPr lang="en-US" dirty="0" smtClean="0"/>
-              <a:t>Collaboration Tool:</a:t>
-            </a:r>
-            <a:endParaRPr lang="en-US" dirty="0" smtClean="0"/>
+              <a:t>IDE:                                 Team Collaboration Tool:</a:t>
+            </a:r>
           </a:p>
           <a:p>
             <a:pPr lvl="8"/>
@@ -4498,45 +4484,97 @@
           <a:p>
             <a:r>
               <a:rPr lang="en-US" dirty="0" smtClean="0"/>
-              <a:t>Team Work</a:t>
+              <a:t>Difficulties</a:t>
             </a:r>
             <a:endParaRPr lang="en-US" dirty="0"/>
           </a:p>
         </p:txBody>
       </p:sp>
-      <p:pic>
-        <p:nvPicPr>
-          <p:cNvPr id="4" name="Content Placeholder 3"/>
-          <p:cNvPicPr>
-            <a:picLocks noGrp="1" noChangeAspect="1"/>
-          </p:cNvPicPr>
+      <p:sp>
+        <p:nvSpPr>
+          <p:cNvPr id="3" name="Content Placeholder 2"/>
+          <p:cNvSpPr>
+            <a:spLocks noGrp="1"/>
+          </p:cNvSpPr>
           <p:nvPr>
             <p:ph idx="1"/>
           </p:nvPr>
-        </p:nvPicPr>
-        <p:blipFill>
-          <a:blip r:embed="rId2" cstate="print">
-            <a:extLst>
-              <a:ext uri="{28A0092B-C50C-407E-A947-70E740481C1C}">
-                <a14:useLocalDpi xmlns:a14="http://schemas.microsoft.com/office/drawing/2010/main" val="0"/>
-              </a:ext>
-            </a:extLst>
-          </a:blip>
-          <a:stretch>
-            <a:fillRect/>
-          </a:stretch>
-        </p:blipFill>
+        </p:nvSpPr>
         <p:spPr>
           <a:xfrm>
-            <a:off x="2075556" y="1426464"/>
-            <a:ext cx="7803604" cy="4389527"/>
+            <a:off x="1219200" y="1346954"/>
+            <a:ext cx="10363200" cy="4572000"/>
           </a:xfrm>
         </p:spPr>
-      </p:pic>
+        <p:txBody>
+          <a:bodyPr>
+            <a:normAutofit fontScale="85000" lnSpcReduction="20000"/>
+          </a:bodyPr>
+          <a:lstStyle/>
+          <a:p>
+            <a:r>
+              <a:rPr lang="en-US" dirty="0" smtClean="0"/>
+              <a:t>Sidebar when logged in</a:t>
+            </a:r>
+          </a:p>
+          <a:p>
+            <a:endParaRPr lang="en-US" dirty="0"/>
+          </a:p>
+          <a:p>
+            <a:r>
+              <a:rPr lang="en-US" dirty="0" smtClean="0"/>
+              <a:t>Calendar</a:t>
+            </a:r>
+          </a:p>
+          <a:p>
+            <a:endParaRPr lang="en-US" dirty="0"/>
+          </a:p>
+          <a:p>
+            <a:r>
+              <a:rPr lang="en-US" dirty="0" smtClean="0"/>
+              <a:t>Ajax</a:t>
+            </a:r>
+          </a:p>
+          <a:p>
+            <a:endParaRPr lang="en-US" dirty="0"/>
+          </a:p>
+          <a:p>
+            <a:r>
+              <a:rPr lang="en-US" dirty="0" smtClean="0"/>
+              <a:t>Extracting emotions from text</a:t>
+            </a:r>
+          </a:p>
+          <a:p>
+            <a:endParaRPr lang="en-US" dirty="0"/>
+          </a:p>
+          <a:p>
+            <a:r>
+              <a:rPr lang="en-US" dirty="0" err="1" smtClean="0"/>
+              <a:t>ML.Net</a:t>
+            </a:r>
+            <a:r>
+              <a:rPr lang="en-US" dirty="0" smtClean="0"/>
+              <a:t> library</a:t>
+            </a:r>
+          </a:p>
+          <a:p>
+            <a:endParaRPr lang="en-US" dirty="0"/>
+          </a:p>
+          <a:p>
+            <a:r>
+              <a:rPr lang="en-US" dirty="0" smtClean="0"/>
+              <a:t>Mobile Friendly</a:t>
+            </a:r>
+          </a:p>
+          <a:p>
+            <a:endParaRPr lang="en-US" dirty="0"/>
+          </a:p>
+        </p:txBody>
+      </p:sp>
     </p:spTree>
     <p:extLst>
       <p:ext uri="{BB962C8B-B14F-4D97-AF65-F5344CB8AC3E}">
-        <p14:creationId xmlns:p14="http://schemas.microsoft.com/office/powerpoint/2010/main" val="2370274954"/>
+        <p14:creationId xmlns:p14="http://schemas.microsoft.com/office/powerpoint/2010/main" val="3716468284"/>
       </p:ext>
     </p:extLst>
   </p:cSld>
@@ -4555,13 +4593,6 @@
       </p:transition>
     </mc:Fallback>
   </mc:AlternateContent>
-  <p:timing>
-    <p:tnLst>
-      <p:par>
-        <p:cTn id="1" dur="indefinite" restart="never" nodeType="tmRoot"/>
-      </p:par>
-    </p:tnLst>
-  </p:timing>
 </p:sld>
 </file>
 
@@ -4599,7 +4630,7 @@
           <a:p>
             <a:r>
               <a:rPr lang="en-US" dirty="0" smtClean="0"/>
-              <a:t>Difficulties</a:t>
+              <a:t>Project Future Realization</a:t>
             </a:r>
             <a:endParaRPr lang="en-US" dirty="0"/>
           </a:p>
@@ -4615,77 +4646,47 @@
             <p:ph idx="1"/>
           </p:nvPr>
         </p:nvSpPr>
-        <p:spPr>
-          <a:xfrm>
-            <a:off x="1219200" y="1346954"/>
-            <a:ext cx="10363200" cy="4572000"/>
-          </a:xfrm>
-        </p:spPr>
-        <p:txBody>
-          <a:bodyPr>
-            <a:normAutofit fontScale="85000" lnSpcReduction="20000"/>
-          </a:bodyPr>
+        <p:spPr/>
+        <p:txBody>
+          <a:bodyPr/>
           <a:lstStyle/>
           <a:p>
             <a:r>
               <a:rPr lang="en-US" dirty="0" smtClean="0"/>
-              <a:t>Sidebar when logged in</a:t>
-            </a:r>
-          </a:p>
-          <a:p>
-            <a:endParaRPr lang="en-US" dirty="0"/>
+              <a:t>A mobile version for both Android and IOS</a:t>
+            </a:r>
           </a:p>
           <a:p>
             <a:r>
               <a:rPr lang="en-US" dirty="0" smtClean="0"/>
-              <a:t>Calendar</a:t>
-            </a:r>
-          </a:p>
-          <a:p>
-            <a:endParaRPr lang="en-US" dirty="0"/>
-          </a:p>
-          <a:p>
+              <a:t>Different ways of logging in (Facebook, Google, </a:t>
+            </a:r>
+            <a:r>
+              <a:rPr lang="en-US" dirty="0" err="1" smtClean="0"/>
+              <a:t>GitHub</a:t>
+            </a:r>
             <a:r>
               <a:rPr lang="en-US" dirty="0" smtClean="0"/>
-              <a:t>Ajax</a:t>
-            </a:r>
-          </a:p>
-          <a:p>
-            <a:endParaRPr lang="en-US" dirty="0"/>
-          </a:p>
-          <a:p>
+              <a:t> </a:t>
+            </a:r>
+            <a:r>
+              <a:rPr lang="en-US" dirty="0" err="1" smtClean="0"/>
+              <a:t>etc</a:t>
+            </a:r>
             <a:r>
               <a:rPr lang="en-US" dirty="0" smtClean="0"/>
-              <a:t>Extracting emotions from </a:t>
-            </a:r>
+              <a:t>)</a:t>
+            </a:r>
+          </a:p>
+          <a:p>
             <a:r>
               <a:rPr lang="en-US" dirty="0" smtClean="0"/>
-              <a:t>text</a:t>
-            </a:r>
-          </a:p>
-          <a:p>
-            <a:endParaRPr lang="en-US" dirty="0"/>
-          </a:p>
-          <a:p>
-            <a:r>
-              <a:rPr lang="en-US" dirty="0" err="1" smtClean="0"/>
-              <a:t>ML.Net</a:t>
-            </a:r>
-            <a:r>
-              <a:rPr lang="en-US" dirty="0" smtClean="0"/>
-              <a:t> library</a:t>
-            </a:r>
-          </a:p>
-          <a:p>
-            <a:endParaRPr lang="en-US" dirty="0"/>
-          </a:p>
-          <a:p>
-            <a:r>
-              <a:rPr lang="en-US" dirty="0" smtClean="0"/>
-              <a:t>Mobile Friendly</a:t>
-            </a:r>
-          </a:p>
-          <a:p>
+              <a:t>Notifications based on </a:t>
+            </a:r>
+            <a:r>
+              <a:rPr lang="en-US" smtClean="0"/>
+              <a:t>user time zone</a:t>
+            </a:r>
             <a:endParaRPr lang="en-US" dirty="0"/>
           </a:p>
         </p:txBody>
@@ -4693,7 +4694,7 @@
     </p:spTree>
     <p:extLst>
       <p:ext uri="{BB962C8B-B14F-4D97-AF65-F5344CB8AC3E}">
-        <p14:creationId xmlns:p14="http://schemas.microsoft.com/office/powerpoint/2010/main" val="3716468284"/>
+        <p14:creationId xmlns:p14="http://schemas.microsoft.com/office/powerpoint/2010/main" val="1946974344"/>
       </p:ext>
     </p:extLst>
   </p:cSld>
@@ -4749,7 +4750,7 @@
           <a:p>
             <a:r>
               <a:rPr lang="en-US" dirty="0" smtClean="0"/>
-              <a:t>Project Future Realization</a:t>
+              <a:t>That’s all, folks!</a:t>
             </a:r>
             <a:endParaRPr lang="en-US" dirty="0"/>
           </a:p>
@@ -4772,43 +4773,7 @@
           <a:p>
             <a:r>
               <a:rPr lang="en-US" dirty="0" smtClean="0"/>
-              <a:t>A mobile version for both Android and </a:t>
-            </a:r>
-            <a:r>
-              <a:rPr lang="en-US" dirty="0" smtClean="0"/>
-              <a:t>IOS</a:t>
-            </a:r>
-          </a:p>
-          <a:p>
-            <a:r>
-              <a:rPr lang="en-US" dirty="0" smtClean="0"/>
-              <a:t>Different ways of logging in (Facebook, Google, </a:t>
-            </a:r>
-            <a:r>
-              <a:rPr lang="en-US" dirty="0" err="1" smtClean="0"/>
-              <a:t>GitHub</a:t>
-            </a:r>
-            <a:r>
-              <a:rPr lang="en-US" dirty="0" smtClean="0"/>
-              <a:t> </a:t>
-            </a:r>
-            <a:r>
-              <a:rPr lang="en-US" dirty="0" err="1" smtClean="0"/>
-              <a:t>etc</a:t>
-            </a:r>
-            <a:r>
-              <a:rPr lang="en-US" dirty="0" smtClean="0"/>
-              <a:t>)</a:t>
-            </a:r>
-          </a:p>
-          <a:p>
-            <a:r>
-              <a:rPr lang="en-US" dirty="0" smtClean="0"/>
-              <a:t>Notifications based on </a:t>
-            </a:r>
-            <a:r>
-              <a:rPr lang="en-US" smtClean="0"/>
-              <a:t>user time zone</a:t>
+              <a:t>Questions?</a:t>
             </a:r>
             <a:endParaRPr lang="en-US" dirty="0"/>
           </a:p>
@@ -4817,7 +4782,7 @@
     </p:spTree>
     <p:extLst>
       <p:ext uri="{BB962C8B-B14F-4D97-AF65-F5344CB8AC3E}">
-        <p14:creationId xmlns:p14="http://schemas.microsoft.com/office/powerpoint/2010/main" val="1946974344"/>
+        <p14:creationId xmlns:p14="http://schemas.microsoft.com/office/powerpoint/2010/main" val="2792188525"/>
       </p:ext>
     </p:extLst>
   </p:cSld>
@@ -4831,94 +4796,6 @@
       </p:transition>
     </mc:Choice>
     <mc:Fallback xmlns="">
-      <p:transition spd="med">
-        <p:fade/>
-      </p:transition>
-    </mc:Fallback>
-  </mc:AlternateContent>
-</p:sld>
-</file>
-
-<file path=ppt/slides/slide8.xml><?xml version="1.0" encoding="utf-8"?>
-<p:sld xmlns:a="http://schemas.openxmlformats.org/drawingml/2006/main" xmlns:r="http://schemas.openxmlformats.org/officeDocument/2006/relationships" xmlns:p="http://schemas.openxmlformats.org/presentationml/2006/main">
-  <p:cSld>
-    <p:spTree>
-      <p:nvGrpSpPr>
-        <p:cNvPr id="1" name=""/>
-        <p:cNvGrpSpPr/>
-        <p:nvPr/>
-      </p:nvGrpSpPr>
-      <p:grpSpPr>
-        <a:xfrm>
-          <a:off x="0" y="0"/>
-          <a:ext cx="0" cy="0"/>
-          <a:chOff x="0" y="0"/>
-          <a:chExt cx="0" cy="0"/>
-        </a:xfrm>
-      </p:grpSpPr>
-      <p:sp>
-        <p:nvSpPr>
-          <p:cNvPr id="2" name="Title 1"/>
-          <p:cNvSpPr>
-            <a:spLocks noGrp="1"/>
-          </p:cNvSpPr>
-          <p:nvPr>
-            <p:ph type="title"/>
-          </p:nvPr>
-        </p:nvSpPr>
-        <p:spPr/>
-        <p:txBody>
-          <a:bodyPr/>
-          <a:lstStyle/>
-          <a:p>
-            <a:r>
-              <a:rPr lang="en-US" dirty="0" smtClean="0"/>
-              <a:t>That’s all, folks!</a:t>
-            </a:r>
-            <a:endParaRPr lang="en-US" dirty="0"/>
-          </a:p>
-        </p:txBody>
-      </p:sp>
-      <p:sp>
-        <p:nvSpPr>
-          <p:cNvPr id="3" name="Content Placeholder 2"/>
-          <p:cNvSpPr>
-            <a:spLocks noGrp="1"/>
-          </p:cNvSpPr>
-          <p:nvPr>
-            <p:ph idx="1"/>
-          </p:nvPr>
-        </p:nvSpPr>
-        <p:spPr/>
-        <p:txBody>
-          <a:bodyPr/>
-          <a:lstStyle/>
-          <a:p>
-            <a:r>
-              <a:rPr lang="en-US" dirty="0" smtClean="0"/>
-              <a:t>Questions?</a:t>
-            </a:r>
-            <a:endParaRPr lang="en-US" dirty="0"/>
-          </a:p>
-        </p:txBody>
-      </p:sp>
-    </p:spTree>
-    <p:extLst>
-      <p:ext uri="{BB962C8B-B14F-4D97-AF65-F5344CB8AC3E}">
-        <p14:creationId xmlns:p14="http://schemas.microsoft.com/office/powerpoint/2010/main" val="2792188525"/>
-      </p:ext>
-    </p:extLst>
-  </p:cSld>
-  <p:clrMapOvr>
-    <a:masterClrMapping/>
-  </p:clrMapOvr>
-  <mc:AlternateContent xmlns:mc="http://schemas.openxmlformats.org/markup-compatibility/2006">
-    <mc:Choice xmlns:p14="http://schemas.microsoft.com/office/powerpoint/2010/main" Requires="p14">
-      <p:transition spd="med" p14:dur="700">
-        <p:fade/>
-      </p:transition>
-    </mc:Choice>
-    <mc:Fallback>
       <p:transition spd="med">
         <p:fade/>
       </p:transition>

</xml_diff>